<commit_message>
Add diagram for Tho
</commit_message>
<xml_diff>
--- a/Hotel managed system.pptx
+++ b/Hotel managed system.pptx
@@ -119,6 +119,11 @@
       </a:defRPr>
     </a:lvl9pPr>
   </p:defaultTextStyle>
+  <p:extLst>
+    <p:ext uri="{EFAFB233-063F-42B5-8137-9DF3F51BA10A}">
+      <p15:sldGuideLst xmlns:p15="http://schemas.microsoft.com/office/powerpoint/2012/main"/>
+    </p:ext>
+  </p:extLst>
 </p:presentation>
 </file>
 
@@ -6248,22 +6253,28 @@
             <p:ph type="title"/>
           </p:nvPr>
         </p:nvSpPr>
-        <p:spPr/>
+        <p:spPr>
+          <a:xfrm>
+            <a:off x="913775" y="618517"/>
+            <a:ext cx="10364451" cy="1596177"/>
+          </a:xfrm>
+        </p:spPr>
         <p:txBody>
           <a:bodyPr/>
           <a:lstStyle/>
           <a:p>
             <a:r>
-              <a:rPr lang="en-US" dirty="0"/>
+              <a:rPr lang="en-US"/>
               <a:t>View user information diagram</a:t>
             </a:r>
             <a:br>
-              <a:rPr lang="en-US" dirty="0"/>
+              <a:rPr lang="en-US"/>
             </a:br>
             <a:r>
-              <a:rPr lang="en-US" dirty="0"/>
+              <a:rPr lang="en-US"/>
               <a:t>(template pattern)</a:t>
             </a:r>
+            <a:endParaRPr lang="en-US" dirty="0"/>
           </a:p>
         </p:txBody>
       </p:sp>
@@ -6283,15 +6294,67 @@
             <p:ph sz="quarter" idx="13"/>
           </p:nvPr>
         </p:nvSpPr>
-        <p:spPr/>
+        <p:spPr>
+          <a:xfrm>
+            <a:off x="913774" y="2367092"/>
+            <a:ext cx="10363826" cy="3424107"/>
+          </a:xfrm>
+        </p:spPr>
         <p:txBody>
           <a:bodyPr/>
           <a:lstStyle/>
           <a:p>
-            <a:endParaRPr lang="en-US"/>
-          </a:p>
-        </p:txBody>
-      </p:sp>
+            <a:endParaRPr lang="en-US" dirty="0"/>
+          </a:p>
+        </p:txBody>
+      </p:sp>
+      <p:pic>
+        <p:nvPicPr>
+          <p:cNvPr id="3074" name="Picture 2" descr="https://lh5.googleusercontent.com/qwCAL0mdE7hno3aiTJRTwUQfMdXAWOdD80XfT0ISHh7AQL18AjQimx--cEojWmqfcZHif-Gp10RkFMKw2k7fRqHAMfAfY9h8Tq5oKaSeTNMbHGj0YF-bLHK36LzkJ0JQ8KuxBCx6">
+            <a:extLst>
+              <a:ext uri="{FF2B5EF4-FFF2-40B4-BE49-F238E27FC236}">
+                <a16:creationId xmlns:a16="http://schemas.microsoft.com/office/drawing/2014/main" id="{FEB2AFF5-BEE3-4DF0-91E0-94A63BE7E662}"/>
+              </a:ext>
+            </a:extLst>
+          </p:cNvPr>
+          <p:cNvPicPr>
+            <a:picLocks noChangeAspect="1" noChangeArrowheads="1"/>
+          </p:cNvPicPr>
+          <p:nvPr/>
+        </p:nvPicPr>
+        <p:blipFill>
+          <a:blip r:embed="rId2">
+            <a:extLst>
+              <a:ext uri="{28A0092B-C50C-407E-A947-70E740481C1C}">
+                <a14:useLocalDpi xmlns:a14="http://schemas.microsoft.com/office/drawing/2010/main" val="0"/>
+              </a:ext>
+            </a:extLst>
+          </a:blip>
+          <a:srcRect/>
+          <a:stretch>
+            <a:fillRect/>
+          </a:stretch>
+        </p:blipFill>
+        <p:spPr bwMode="auto">
+          <a:xfrm>
+            <a:off x="5250731" y="2406539"/>
+            <a:ext cx="2036190" cy="3384660"/>
+          </a:xfrm>
+          <a:prstGeom prst="rect">
+            <a:avLst/>
+          </a:prstGeom>
+          <a:noFill/>
+          <a:extLst>
+            <a:ext uri="{909E8E84-426E-40DD-AFC4-6F175D3DCCD1}">
+              <a14:hiddenFill xmlns:a14="http://schemas.microsoft.com/office/drawing/2010/main">
+                <a:solidFill>
+                  <a:srgbClr val="FFFFFF"/>
+                </a:solidFill>
+              </a14:hiddenFill>
+            </a:ext>
+          </a:extLst>
+        </p:spPr>
+      </p:pic>
     </p:spTree>
     <p:extLst>
       <p:ext uri="{BB962C8B-B14F-4D97-AF65-F5344CB8AC3E}">
@@ -9126,31 +9189,55 @@
           </a:p>
         </p:txBody>
       </p:sp>
-      <p:sp>
-        <p:nvSpPr>
-          <p:cNvPr id="3" name="Content Placeholder 2">
+      <p:pic>
+        <p:nvPicPr>
+          <p:cNvPr id="1026" name="Picture 2" descr="https://lh4.googleusercontent.com/5JABc6wvW8TWFfuzSOIYXp30K2hDDToT0z34J2XUWBer4ZKj_zmd4IwnXj1YJT-H-AaKBmnADUmKPyXMzoY_c71AFJWtQvxbn5BV3T1sksmsGFBQ_d5_so0btwJgMoRDDigRHN9v">
             <a:extLst>
               <a:ext uri="{FF2B5EF4-FFF2-40B4-BE49-F238E27FC236}">
-                <a16:creationId xmlns:a16="http://schemas.microsoft.com/office/drawing/2014/main" id="{9E6AF24B-80CF-4678-AFB2-B0E09B362E4C}"/>
+                <a16:creationId xmlns:a16="http://schemas.microsoft.com/office/drawing/2014/main" id="{20C909BE-747A-4A75-8583-518F3C0B0721}"/>
               </a:ext>
             </a:extLst>
           </p:cNvPr>
-          <p:cNvSpPr>
-            <a:spLocks noGrp="1"/>
-          </p:cNvSpPr>
+          <p:cNvPicPr>
+            <a:picLocks noGrp="1" noChangeAspect="1" noChangeArrowheads="1"/>
+          </p:cNvPicPr>
           <p:nvPr>
             <p:ph sz="quarter" idx="13"/>
           </p:nvPr>
-        </p:nvSpPr>
-        <p:spPr/>
-        <p:txBody>
-          <a:bodyPr/>
-          <a:lstStyle/>
-          <a:p>
-            <a:endParaRPr lang="en-US" dirty="0"/>
-          </a:p>
-        </p:txBody>
-      </p:sp>
+        </p:nvPicPr>
+        <p:blipFill>
+          <a:blip r:embed="rId2">
+            <a:extLst>
+              <a:ext uri="{28A0092B-C50C-407E-A947-70E740481C1C}">
+                <a14:useLocalDpi xmlns:a14="http://schemas.microsoft.com/office/drawing/2010/main" val="0"/>
+              </a:ext>
+            </a:extLst>
+          </a:blip>
+          <a:srcRect/>
+          <a:stretch>
+            <a:fillRect/>
+          </a:stretch>
+        </p:blipFill>
+        <p:spPr bwMode="auto">
+          <a:xfrm>
+            <a:off x="1451061" y="2820161"/>
+            <a:ext cx="9289878" cy="2119484"/>
+          </a:xfrm>
+          <a:prstGeom prst="rect">
+            <a:avLst/>
+          </a:prstGeom>
+          <a:noFill/>
+          <a:extLst>
+            <a:ext uri="{909E8E84-426E-40DD-AFC4-6F175D3DCCD1}">
+              <a14:hiddenFill xmlns:a14="http://schemas.microsoft.com/office/drawing/2010/main">
+                <a:solidFill>
+                  <a:srgbClr val="FFFFFF"/>
+                </a:solidFill>
+              </a14:hiddenFill>
+            </a:ext>
+          </a:extLst>
+        </p:spPr>
+      </p:pic>
     </p:spTree>
     <p:extLst>
       <p:ext uri="{BB962C8B-B14F-4D97-AF65-F5344CB8AC3E}">
@@ -9241,6 +9328,53 @@
           </a:p>
         </p:txBody>
       </p:sp>
+      <p:pic>
+        <p:nvPicPr>
+          <p:cNvPr id="2050" name="Picture 2" descr="https://lh5.googleusercontent.com/w2PDfzis5Uuv-V2Oe_8PYA66IeBy0FX_4_xU2JRXBYX1iPjpkRmKhSXR0AZ6aCimNEUqbaTta3VlmLft65jxlEPloAXyLcZrFA5_y32mhfjVXXfT4JWsxNPny0xBfpH-PSs19e7U">
+            <a:extLst>
+              <a:ext uri="{FF2B5EF4-FFF2-40B4-BE49-F238E27FC236}">
+                <a16:creationId xmlns:a16="http://schemas.microsoft.com/office/drawing/2014/main" id="{F2C825E7-409C-4041-860C-35D7B1C50A1D}"/>
+              </a:ext>
+            </a:extLst>
+          </p:cNvPr>
+          <p:cNvPicPr>
+            <a:picLocks noChangeAspect="1" noChangeArrowheads="1"/>
+          </p:cNvPicPr>
+          <p:nvPr/>
+        </p:nvPicPr>
+        <p:blipFill>
+          <a:blip r:embed="rId2">
+            <a:extLst>
+              <a:ext uri="{28A0092B-C50C-407E-A947-70E740481C1C}">
+                <a14:useLocalDpi xmlns:a14="http://schemas.microsoft.com/office/drawing/2010/main" val="0"/>
+              </a:ext>
+            </a:extLst>
+          </a:blip>
+          <a:srcRect/>
+          <a:stretch>
+            <a:fillRect/>
+          </a:stretch>
+        </p:blipFill>
+        <p:spPr bwMode="auto">
+          <a:xfrm>
+            <a:off x="878765" y="2433132"/>
+            <a:ext cx="10398835" cy="3358067"/>
+          </a:xfrm>
+          <a:prstGeom prst="rect">
+            <a:avLst/>
+          </a:prstGeom>
+          <a:noFill/>
+          <a:extLst>
+            <a:ext uri="{909E8E84-426E-40DD-AFC4-6F175D3DCCD1}">
+              <a14:hiddenFill xmlns:a14="http://schemas.microsoft.com/office/drawing/2010/main">
+                <a:solidFill>
+                  <a:srgbClr val="FFFFFF"/>
+                </a:solidFill>
+              </a14:hiddenFill>
+            </a:ext>
+          </a:extLst>
+        </p:spPr>
+      </p:pic>
     </p:spTree>
     <p:extLst>
       <p:ext uri="{BB962C8B-B14F-4D97-AF65-F5344CB8AC3E}">

</xml_diff>

<commit_message>
Updated slides for promotion
</commit_message>
<xml_diff>
--- a/Hotel managed system.pptx
+++ b/Hotel managed system.pptx
@@ -1,6 +1,6 @@
 
 <file path=ppt/presentation.xml><?xml version="1.0" encoding="utf-8"?>
-<p:presentation xmlns:a="http://schemas.openxmlformats.org/drawingml/2006/main" xmlns:r="http://schemas.openxmlformats.org/officeDocument/2006/relationships" xmlns:p="http://schemas.openxmlformats.org/presentationml/2006/main" autoCompressPictures="0">
+<p:presentation xmlns:a="http://schemas.openxmlformats.org/drawingml/2006/main" xmlns:r="http://schemas.openxmlformats.org/officeDocument/2006/relationships" xmlns:p="http://schemas.openxmlformats.org/presentationml/2006/main" saveSubsetFonts="1" autoCompressPictures="0">
   <p:sldMasterIdLst>
     <p:sldMasterId id="2147483648" r:id="rId1"/>
   </p:sldMasterIdLst>
@@ -15,12 +15,15 @@
     <p:sldId id="262" r:id="rId9"/>
     <p:sldId id="263" r:id="rId10"/>
     <p:sldId id="264" r:id="rId11"/>
-    <p:sldId id="265" r:id="rId12"/>
-    <p:sldId id="266" r:id="rId13"/>
-    <p:sldId id="267" r:id="rId14"/>
-    <p:sldId id="269" r:id="rId15"/>
-    <p:sldId id="270" r:id="rId16"/>
-    <p:sldId id="271" r:id="rId17"/>
+    <p:sldId id="272" r:id="rId12"/>
+    <p:sldId id="274" r:id="rId13"/>
+    <p:sldId id="273" r:id="rId14"/>
+    <p:sldId id="265" r:id="rId15"/>
+    <p:sldId id="266" r:id="rId16"/>
+    <p:sldId id="267" r:id="rId17"/>
+    <p:sldId id="269" r:id="rId18"/>
+    <p:sldId id="270" r:id="rId19"/>
+    <p:sldId id="271" r:id="rId20"/>
   </p:sldIdLst>
   <p:sldSz cx="12192000" cy="6858000"/>
   <p:notesSz cx="6858000" cy="9144000"/>
@@ -119,6 +122,11 @@
       </a:defRPr>
     </a:lvl9pPr>
   </p:defaultTextStyle>
+  <p:extLst>
+    <p:ext uri="{EFAFB233-063F-42B5-8137-9DF3F51BA10A}">
+      <p15:sldGuideLst xmlns:p15="http://schemas.microsoft.com/office/powerpoint/2012/main"/>
+    </p:ext>
+  </p:extLst>
 </p:presentation>
 </file>
 
@@ -293,7 +301,7 @@
           <a:p>
             <a:fld id="{48A87A34-81AB-432B-8DAE-1953F412C126}" type="datetimeFigureOut">
               <a:rPr lang="en-US" dirty="0"/>
-              <a:t>5/20/2018</a:t>
+              <a:t>5/20/18</a:t>
             </a:fld>
             <a:endParaRPr lang="en-US" dirty="0"/>
           </a:p>
@@ -600,7 +608,7 @@
           <a:p>
             <a:fld id="{48A87A34-81AB-432B-8DAE-1953F412C126}" type="datetimeFigureOut">
               <a:rPr lang="en-US" dirty="0"/>
-              <a:t>5/20/2018</a:t>
+              <a:t>5/20/18</a:t>
             </a:fld>
             <a:endParaRPr lang="en-US" dirty="0"/>
           </a:p>
@@ -817,7 +825,7 @@
           <a:p>
             <a:fld id="{48A87A34-81AB-432B-8DAE-1953F412C126}" type="datetimeFigureOut">
               <a:rPr lang="en-US" dirty="0"/>
-              <a:t>5/20/2018</a:t>
+              <a:t>5/20/18</a:t>
             </a:fld>
             <a:endParaRPr lang="en-US" dirty="0"/>
           </a:p>
@@ -1103,7 +1111,7 @@
           <a:p>
             <a:fld id="{48A87A34-81AB-432B-8DAE-1953F412C126}" type="datetimeFigureOut">
               <a:rPr lang="en-US" dirty="0"/>
-              <a:t>5/20/2018</a:t>
+              <a:t>5/20/18</a:t>
             </a:fld>
             <a:endParaRPr lang="en-US" dirty="0"/>
           </a:p>
@@ -1552,7 +1560,7 @@
           <a:p>
             <a:fld id="{48A87A34-81AB-432B-8DAE-1953F412C126}" type="datetimeFigureOut">
               <a:rPr lang="en-US" dirty="0"/>
-              <a:t>5/20/2018</a:t>
+              <a:t>5/20/18</a:t>
             </a:fld>
             <a:endParaRPr lang="en-US" dirty="0"/>
           </a:p>
@@ -2123,7 +2131,7 @@
           <a:p>
             <a:fld id="{48A87A34-81AB-432B-8DAE-1953F412C126}" type="datetimeFigureOut">
               <a:rPr lang="en-US" dirty="0"/>
-              <a:t>5/20/2018</a:t>
+              <a:t>5/20/18</a:t>
             </a:fld>
             <a:endParaRPr lang="en-US" dirty="0"/>
           </a:p>
@@ -2970,7 +2978,7 @@
           <a:p>
             <a:fld id="{48A87A34-81AB-432B-8DAE-1953F412C126}" type="datetimeFigureOut">
               <a:rPr lang="en-US" dirty="0"/>
-              <a:t>5/20/2018</a:t>
+              <a:t>5/20/18</a:t>
             </a:fld>
             <a:endParaRPr lang="en-US" dirty="0"/>
           </a:p>
@@ -3170,7 +3178,7 @@
           <a:p>
             <a:fld id="{48A87A34-81AB-432B-8DAE-1953F412C126}" type="datetimeFigureOut">
               <a:rPr lang="en-US" dirty="0"/>
-              <a:t>5/20/2018</a:t>
+              <a:t>5/20/18</a:t>
             </a:fld>
             <a:endParaRPr lang="en-US" dirty="0"/>
           </a:p>
@@ -3379,7 +3387,7 @@
           <a:p>
             <a:fld id="{48A87A34-81AB-432B-8DAE-1953F412C126}" type="datetimeFigureOut">
               <a:rPr lang="en-US" dirty="0"/>
-              <a:t>5/20/2018</a:t>
+              <a:t>5/20/18</a:t>
             </a:fld>
             <a:endParaRPr lang="en-US" dirty="0"/>
           </a:p>
@@ -3579,7 +3587,7 @@
           <a:p>
             <a:fld id="{48A87A34-81AB-432B-8DAE-1953F412C126}" type="datetimeFigureOut">
               <a:rPr lang="en-US" dirty="0"/>
-              <a:t>5/20/2018</a:t>
+              <a:t>5/20/18</a:t>
             </a:fld>
             <a:endParaRPr lang="en-US" dirty="0"/>
           </a:p>
@@ -3854,7 +3862,7 @@
           <a:p>
             <a:fld id="{48A87A34-81AB-432B-8DAE-1953F412C126}" type="datetimeFigureOut">
               <a:rPr lang="en-US" dirty="0"/>
-              <a:t>5/20/2018</a:t>
+              <a:t>5/20/18</a:t>
             </a:fld>
             <a:endParaRPr lang="en-US" dirty="0"/>
           </a:p>
@@ -4116,7 +4124,7 @@
           <a:p>
             <a:fld id="{48A87A34-81AB-432B-8DAE-1953F412C126}" type="datetimeFigureOut">
               <a:rPr lang="en-US" dirty="0"/>
-              <a:t>5/20/2018</a:t>
+              <a:t>5/20/18</a:t>
             </a:fld>
             <a:endParaRPr lang="en-US" dirty="0"/>
           </a:p>
@@ -4526,7 +4534,7 @@
           <a:p>
             <a:fld id="{48A87A34-81AB-432B-8DAE-1953F412C126}" type="datetimeFigureOut">
               <a:rPr lang="en-US" dirty="0"/>
-              <a:t>5/20/2018</a:t>
+              <a:t>5/20/18</a:t>
             </a:fld>
             <a:endParaRPr lang="en-US" dirty="0"/>
           </a:p>
@@ -4669,7 +4677,7 @@
           <a:p>
             <a:fld id="{48A87A34-81AB-432B-8DAE-1953F412C126}" type="datetimeFigureOut">
               <a:rPr lang="en-US" dirty="0"/>
-              <a:t>5/20/2018</a:t>
+              <a:t>5/20/18</a:t>
             </a:fld>
             <a:endParaRPr lang="en-US" dirty="0"/>
           </a:p>
@@ -4789,7 +4797,7 @@
           <a:p>
             <a:fld id="{48A87A34-81AB-432B-8DAE-1953F412C126}" type="datetimeFigureOut">
               <a:rPr lang="en-US" dirty="0"/>
-              <a:t>5/20/2018</a:t>
+              <a:t>5/20/18</a:t>
             </a:fld>
             <a:endParaRPr lang="en-US" dirty="0"/>
           </a:p>
@@ -5063,7 +5071,7 @@
           <a:p>
             <a:fld id="{48A87A34-81AB-432B-8DAE-1953F412C126}" type="datetimeFigureOut">
               <a:rPr lang="en-US" dirty="0"/>
-              <a:t>5/20/2018</a:t>
+              <a:t>5/20/18</a:t>
             </a:fld>
             <a:endParaRPr lang="en-US" dirty="0"/>
           </a:p>
@@ -5370,7 +5378,7 @@
           <a:p>
             <a:fld id="{48A87A34-81AB-432B-8DAE-1953F412C126}" type="datetimeFigureOut">
               <a:rPr lang="en-US" dirty="0"/>
-              <a:t>5/20/2018</a:t>
+              <a:t>5/20/18</a:t>
             </a:fld>
             <a:endParaRPr lang="en-US" dirty="0"/>
           </a:p>
@@ -5619,7 +5627,7 @@
             <a:fld id="{48A87A34-81AB-432B-8DAE-1953F412C126}" type="datetimeFigureOut">
               <a:rPr lang="en-US" dirty="0"/>
               <a:pPr/>
-              <a:t>5/20/2018</a:t>
+              <a:t>5/20/18</a:t>
             </a:fld>
             <a:endParaRPr lang="en-US" dirty="0"/>
           </a:p>
@@ -6064,7 +6072,7 @@
           <p:cNvPr id="2" name="Title 1">
             <a:extLst>
               <a:ext uri="{FF2B5EF4-FFF2-40B4-BE49-F238E27FC236}">
-                <a16:creationId xmlns:a16="http://schemas.microsoft.com/office/drawing/2014/main" id="{92846ECF-CDA2-40FE-8389-4B1AE0B3B92B}"/>
+                <a16:creationId xmlns:a16="http://schemas.microsoft.com/office/drawing/2014/main" xmlns="" id="{92846ECF-CDA2-40FE-8389-4B1AE0B3B92B}"/>
               </a:ext>
             </a:extLst>
           </p:cNvPr>
@@ -6097,7 +6105,7 @@
           <p:cNvPr id="3" name="Subtitle 2">
             <a:extLst>
               <a:ext uri="{FF2B5EF4-FFF2-40B4-BE49-F238E27FC236}">
-                <a16:creationId xmlns:a16="http://schemas.microsoft.com/office/drawing/2014/main" id="{7B9DDED9-8A06-429A-BF4A-44FF599C804B}"/>
+                <a16:creationId xmlns:a16="http://schemas.microsoft.com/office/drawing/2014/main" xmlns="" id="{7B9DDED9-8A06-429A-BF4A-44FF599C804B}"/>
               </a:ext>
             </a:extLst>
           </p:cNvPr>
@@ -6237,7 +6245,7 @@
           <p:cNvPr id="2" name="Title 1">
             <a:extLst>
               <a:ext uri="{FF2B5EF4-FFF2-40B4-BE49-F238E27FC236}">
-                <a16:creationId xmlns:a16="http://schemas.microsoft.com/office/drawing/2014/main" id="{0EE5714A-E60A-463B-A1AC-D8DEE49DC78D}"/>
+                <a16:creationId xmlns:a16="http://schemas.microsoft.com/office/drawing/2014/main" xmlns="" id="{0EE5714A-E60A-463B-A1AC-D8DEE49DC78D}"/>
               </a:ext>
             </a:extLst>
           </p:cNvPr>
@@ -6272,7 +6280,7 @@
           <p:cNvPr id="3" name="Content Placeholder 2">
             <a:extLst>
               <a:ext uri="{FF2B5EF4-FFF2-40B4-BE49-F238E27FC236}">
-                <a16:creationId xmlns:a16="http://schemas.microsoft.com/office/drawing/2014/main" id="{B4E1467F-5E4E-492A-8829-D682AE653558}"/>
+                <a16:creationId xmlns:a16="http://schemas.microsoft.com/office/drawing/2014/main" xmlns="" id="{B4E1467F-5E4E-492A-8829-D682AE653558}"/>
               </a:ext>
             </a:extLst>
           </p:cNvPr>
@@ -6324,13 +6332,7 @@
       </p:grpSpPr>
       <p:sp>
         <p:nvSpPr>
-          <p:cNvPr id="2" name="Title 1">
-            <a:extLst>
-              <a:ext uri="{FF2B5EF4-FFF2-40B4-BE49-F238E27FC236}">
-                <a16:creationId xmlns:a16="http://schemas.microsoft.com/office/drawing/2014/main" id="{C74AAE50-8A6E-4CB9-B65D-DFC9DC47866B}"/>
-              </a:ext>
-            </a:extLst>
-          </p:cNvPr>
+          <p:cNvPr id="2" name="Title 1"/>
           <p:cNvSpPr>
             <a:spLocks noGrp="1"/>
           </p:cNvSpPr>
@@ -6344,48 +6346,60 @@
           <a:lstStyle/>
           <a:p>
             <a:r>
+              <a:rPr lang="en-US" dirty="0" smtClean="0"/>
+              <a:t>Create 4 type of Promotion diagram</a:t>
+            </a:r>
+            <a:r>
               <a:rPr lang="en-US" dirty="0"/>
-              <a:t>Promotion diagram</a:t>
+              <a:t/>
             </a:r>
             <a:br>
               <a:rPr lang="en-US" dirty="0"/>
             </a:br>
             <a:r>
+              <a:rPr lang="en-US" dirty="0" smtClean="0"/>
+              <a:t>(Factory pattern</a:t>
+            </a:r>
+            <a:r>
               <a:rPr lang="en-US" dirty="0"/>
-              <a:t>(command pattern)</a:t>
-            </a:r>
-          </a:p>
-        </p:txBody>
-      </p:sp>
-      <p:sp>
-        <p:nvSpPr>
-          <p:cNvPr id="3" name="Content Placeholder 2">
+              <a:t>)</a:t>
+            </a:r>
+          </a:p>
+        </p:txBody>
+      </p:sp>
+      <p:pic>
+        <p:nvPicPr>
+          <p:cNvPr id="8" name="Content Placeholder 7"/>
+          <p:cNvPicPr>
+            <a:picLocks noGrp="1" noChangeAspect="1"/>
+          </p:cNvPicPr>
+          <p:nvPr>
+            <p:ph sz="quarter" idx="13"/>
+          </p:nvPr>
+        </p:nvPicPr>
+        <p:blipFill>
+          <a:blip r:embed="rId2">
             <a:extLst>
-              <a:ext uri="{FF2B5EF4-FFF2-40B4-BE49-F238E27FC236}">
-                <a16:creationId xmlns:a16="http://schemas.microsoft.com/office/drawing/2014/main" id="{EED62229-84E3-4508-8CCA-BCAD9292E48F}"/>
+              <a:ext uri="{28A0092B-C50C-407E-A947-70E740481C1C}">
+                <a14:useLocalDpi xmlns:a14="http://schemas.microsoft.com/office/drawing/2010/main" val="0"/>
               </a:ext>
             </a:extLst>
-          </p:cNvPr>
-          <p:cNvSpPr>
-            <a:spLocks noGrp="1"/>
-          </p:cNvSpPr>
-          <p:nvPr>
-            <p:ph sz="quarter" idx="13"/>
-          </p:nvPr>
-        </p:nvSpPr>
-        <p:spPr/>
-        <p:txBody>
-          <a:bodyPr/>
-          <a:lstStyle/>
-          <a:p>
-            <a:endParaRPr lang="en-US" dirty="0"/>
-          </a:p>
-        </p:txBody>
-      </p:sp>
+          </a:blip>
+          <a:stretch>
+            <a:fillRect/>
+          </a:stretch>
+        </p:blipFill>
+        <p:spPr>
+          <a:xfrm>
+            <a:off x="2243733" y="2366963"/>
+            <a:ext cx="7704533" cy="3424237"/>
+          </a:xfrm>
+        </p:spPr>
+      </p:pic>
     </p:spTree>
     <p:extLst>
       <p:ext uri="{BB962C8B-B14F-4D97-AF65-F5344CB8AC3E}">
-        <p14:creationId xmlns:p14="http://schemas.microsoft.com/office/powerpoint/2010/main" val="3107806196"/>
+        <p14:creationId xmlns:p14="http://schemas.microsoft.com/office/powerpoint/2010/main" val="525661724"/>
       </p:ext>
     </p:extLst>
   </p:cSld>
@@ -6414,10 +6428,202 @@
       </p:grpSpPr>
       <p:sp>
         <p:nvSpPr>
+          <p:cNvPr id="2" name="Title 1"/>
+          <p:cNvSpPr>
+            <a:spLocks noGrp="1"/>
+          </p:cNvSpPr>
+          <p:nvPr>
+            <p:ph type="title"/>
+          </p:nvPr>
+        </p:nvSpPr>
+        <p:spPr/>
+        <p:txBody>
+          <a:bodyPr/>
+          <a:lstStyle/>
+          <a:p>
+            <a:r>
+              <a:rPr lang="en-US" dirty="0" smtClean="0"/>
+              <a:t>Compute Promotion type discount diagram</a:t>
+            </a:r>
+            <a:r>
+              <a:rPr lang="en-US" dirty="0"/>
+              <a:t/>
+            </a:r>
+            <a:br>
+              <a:rPr lang="en-US" dirty="0"/>
+            </a:br>
+            <a:r>
+              <a:rPr lang="en-US" dirty="0" smtClean="0"/>
+              <a:t>(Command pattern</a:t>
+            </a:r>
+            <a:r>
+              <a:rPr lang="en-US" dirty="0"/>
+              <a:t>)</a:t>
+            </a:r>
+          </a:p>
+        </p:txBody>
+      </p:sp>
+      <p:pic>
+        <p:nvPicPr>
+          <p:cNvPr id="6" name="Content Placeholder 5"/>
+          <p:cNvPicPr>
+            <a:picLocks noGrp="1" noChangeAspect="1"/>
+          </p:cNvPicPr>
+          <p:nvPr>
+            <p:ph sz="quarter" idx="13"/>
+          </p:nvPr>
+        </p:nvPicPr>
+        <p:blipFill>
+          <a:blip r:embed="rId2">
+            <a:extLst>
+              <a:ext uri="{28A0092B-C50C-407E-A947-70E740481C1C}">
+                <a14:useLocalDpi xmlns:a14="http://schemas.microsoft.com/office/drawing/2010/main" val="0"/>
+              </a:ext>
+            </a:extLst>
+          </a:blip>
+          <a:stretch>
+            <a:fillRect/>
+          </a:stretch>
+        </p:blipFill>
+        <p:spPr>
+          <a:xfrm>
+            <a:off x="1871799" y="2495998"/>
+            <a:ext cx="8448402" cy="3424237"/>
+          </a:xfrm>
+        </p:spPr>
+      </p:pic>
+    </p:spTree>
+    <p:extLst>
+      <p:ext uri="{BB962C8B-B14F-4D97-AF65-F5344CB8AC3E}">
+        <p14:creationId xmlns:p14="http://schemas.microsoft.com/office/powerpoint/2010/main" val="1494034295"/>
+      </p:ext>
+    </p:extLst>
+  </p:cSld>
+  <p:clrMapOvr>
+    <a:masterClrMapping/>
+  </p:clrMapOvr>
+</p:sld>
+</file>
+
+<file path=ppt/slides/slide13.xml><?xml version="1.0" encoding="utf-8"?>
+<p:sld xmlns:a="http://schemas.openxmlformats.org/drawingml/2006/main" xmlns:r="http://schemas.openxmlformats.org/officeDocument/2006/relationships" xmlns:p="http://schemas.openxmlformats.org/presentationml/2006/main">
+  <p:cSld>
+    <p:spTree>
+      <p:nvGrpSpPr>
+        <p:cNvPr id="1" name=""/>
+        <p:cNvGrpSpPr/>
+        <p:nvPr/>
+      </p:nvGrpSpPr>
+      <p:grpSpPr>
+        <a:xfrm>
+          <a:off x="0" y="0"/>
+          <a:ext cx="0" cy="0"/>
+          <a:chOff x="0" y="0"/>
+          <a:chExt cx="0" cy="0"/>
+        </a:xfrm>
+      </p:grpSpPr>
+      <p:sp>
+        <p:nvSpPr>
+          <p:cNvPr id="2" name="Title 1"/>
+          <p:cNvSpPr>
+            <a:spLocks noGrp="1"/>
+          </p:cNvSpPr>
+          <p:nvPr>
+            <p:ph type="title"/>
+          </p:nvPr>
+        </p:nvSpPr>
+        <p:spPr/>
+        <p:txBody>
+          <a:bodyPr/>
+          <a:lstStyle/>
+          <a:p>
+            <a:r>
+              <a:rPr lang="en-US" dirty="0" smtClean="0"/>
+              <a:t>Clone Promotion diagram</a:t>
+            </a:r>
+            <a:r>
+              <a:rPr lang="en-US" dirty="0"/>
+              <a:t/>
+            </a:r>
+            <a:br>
+              <a:rPr lang="en-US" dirty="0"/>
+            </a:br>
+            <a:r>
+              <a:rPr lang="en-US" dirty="0" smtClean="0"/>
+              <a:t>(Prototype pattern</a:t>
+            </a:r>
+            <a:r>
+              <a:rPr lang="en-US" dirty="0"/>
+              <a:t>)</a:t>
+            </a:r>
+          </a:p>
+        </p:txBody>
+      </p:sp>
+      <p:pic>
+        <p:nvPicPr>
+          <p:cNvPr id="4" name="Content Placeholder 3"/>
+          <p:cNvPicPr>
+            <a:picLocks noGrp="1" noChangeAspect="1"/>
+          </p:cNvPicPr>
+          <p:nvPr>
+            <p:ph sz="quarter" idx="13"/>
+          </p:nvPr>
+        </p:nvPicPr>
+        <p:blipFill>
+          <a:blip r:embed="rId2">
+            <a:extLst>
+              <a:ext uri="{28A0092B-C50C-407E-A947-70E740481C1C}">
+                <a14:useLocalDpi xmlns:a14="http://schemas.microsoft.com/office/drawing/2010/main" val="0"/>
+              </a:ext>
+            </a:extLst>
+          </a:blip>
+          <a:stretch>
+            <a:fillRect/>
+          </a:stretch>
+        </p:blipFill>
+        <p:spPr>
+          <a:xfrm>
+            <a:off x="2477104" y="2366963"/>
+            <a:ext cx="7237792" cy="3424237"/>
+          </a:xfrm>
+        </p:spPr>
+      </p:pic>
+    </p:spTree>
+    <p:extLst>
+      <p:ext uri="{BB962C8B-B14F-4D97-AF65-F5344CB8AC3E}">
+        <p14:creationId xmlns:p14="http://schemas.microsoft.com/office/powerpoint/2010/main" val="49585995"/>
+      </p:ext>
+    </p:extLst>
+  </p:cSld>
+  <p:clrMapOvr>
+    <a:masterClrMapping/>
+  </p:clrMapOvr>
+</p:sld>
+</file>
+
+<file path=ppt/slides/slide14.xml><?xml version="1.0" encoding="utf-8"?>
+<p:sld xmlns:a="http://schemas.openxmlformats.org/drawingml/2006/main" xmlns:r="http://schemas.openxmlformats.org/officeDocument/2006/relationships" xmlns:p="http://schemas.openxmlformats.org/presentationml/2006/main">
+  <p:cSld>
+    <p:spTree>
+      <p:nvGrpSpPr>
+        <p:cNvPr id="1" name=""/>
+        <p:cNvGrpSpPr/>
+        <p:nvPr/>
+      </p:nvGrpSpPr>
+      <p:grpSpPr>
+        <a:xfrm>
+          <a:off x="0" y="0"/>
+          <a:ext cx="0" cy="0"/>
+          <a:chOff x="0" y="0"/>
+          <a:chExt cx="0" cy="0"/>
+        </a:xfrm>
+      </p:grpSpPr>
+      <p:sp>
+        <p:nvSpPr>
           <p:cNvPr id="2" name="Title 1">
             <a:extLst>
               <a:ext uri="{FF2B5EF4-FFF2-40B4-BE49-F238E27FC236}">
-                <a16:creationId xmlns:a16="http://schemas.microsoft.com/office/drawing/2014/main" id="{67F5D0F3-00A9-4EE6-BC23-B483CF623CC8}"/>
+                <a16:creationId xmlns:a16="http://schemas.microsoft.com/office/drawing/2014/main" xmlns="" id="{C74AAE50-8A6E-4CB9-B65D-DFC9DC47866B}"/>
               </a:ext>
             </a:extLst>
           </p:cNvPr>
@@ -6434,25 +6640,92 @@
           <a:lstStyle/>
           <a:p>
             <a:r>
+              <a:rPr lang="en-US" dirty="0" smtClean="0"/>
+              <a:t>System Initialize and Broadcast Promotion diagram</a:t>
+            </a:r>
+            <a:r>
               <a:rPr lang="en-US" dirty="0"/>
-              <a:t>Promotion diagram</a:t>
+              <a:t/>
             </a:r>
             <a:br>
               <a:rPr lang="en-US" dirty="0"/>
             </a:br>
             <a:r>
+              <a:rPr lang="en-US" dirty="0" smtClean="0"/>
+              <a:t>(Mediator pattern</a:t>
+            </a:r>
+            <a:r>
               <a:rPr lang="en-US" dirty="0"/>
-              <a:t>(prototype pattern)</a:t>
-            </a:r>
-          </a:p>
-        </p:txBody>
-      </p:sp>
-      <p:sp>
-        <p:nvSpPr>
-          <p:cNvPr id="3" name="Content Placeholder 2">
+              <a:t>)</a:t>
+            </a:r>
+          </a:p>
+        </p:txBody>
+      </p:sp>
+      <p:pic>
+        <p:nvPicPr>
+          <p:cNvPr id="4" name="Content Placeholder 3"/>
+          <p:cNvPicPr>
+            <a:picLocks noGrp="1" noChangeAspect="1"/>
+          </p:cNvPicPr>
+          <p:nvPr>
+            <p:ph sz="quarter" idx="13"/>
+          </p:nvPr>
+        </p:nvPicPr>
+        <p:blipFill>
+          <a:blip r:embed="rId2">
+            <a:extLst>
+              <a:ext uri="{28A0092B-C50C-407E-A947-70E740481C1C}">
+                <a14:useLocalDpi xmlns:a14="http://schemas.microsoft.com/office/drawing/2010/main" val="0"/>
+              </a:ext>
+            </a:extLst>
+          </a:blip>
+          <a:stretch>
+            <a:fillRect/>
+          </a:stretch>
+        </p:blipFill>
+        <p:spPr>
+          <a:xfrm>
+            <a:off x="1137314" y="2362274"/>
+            <a:ext cx="9459119" cy="3424237"/>
+          </a:xfrm>
+        </p:spPr>
+      </p:pic>
+    </p:spTree>
+    <p:extLst>
+      <p:ext uri="{BB962C8B-B14F-4D97-AF65-F5344CB8AC3E}">
+        <p14:creationId xmlns:p14="http://schemas.microsoft.com/office/powerpoint/2010/main" val="3107806196"/>
+      </p:ext>
+    </p:extLst>
+  </p:cSld>
+  <p:clrMapOvr>
+    <a:masterClrMapping/>
+  </p:clrMapOvr>
+</p:sld>
+</file>
+
+<file path=ppt/slides/slide15.xml><?xml version="1.0" encoding="utf-8"?>
+<p:sld xmlns:a="http://schemas.openxmlformats.org/drawingml/2006/main" xmlns:r="http://schemas.openxmlformats.org/officeDocument/2006/relationships" xmlns:p="http://schemas.openxmlformats.org/presentationml/2006/main">
+  <p:cSld>
+    <p:spTree>
+      <p:nvGrpSpPr>
+        <p:cNvPr id="1" name=""/>
+        <p:cNvGrpSpPr/>
+        <p:nvPr/>
+      </p:nvGrpSpPr>
+      <p:grpSpPr>
+        <a:xfrm>
+          <a:off x="0" y="0"/>
+          <a:ext cx="0" cy="0"/>
+          <a:chOff x="0" y="0"/>
+          <a:chExt cx="0" cy="0"/>
+        </a:xfrm>
+      </p:grpSpPr>
+      <p:sp>
+        <p:nvSpPr>
+          <p:cNvPr id="2" name="Title 1">
             <a:extLst>
               <a:ext uri="{FF2B5EF4-FFF2-40B4-BE49-F238E27FC236}">
-                <a16:creationId xmlns:a16="http://schemas.microsoft.com/office/drawing/2014/main" id="{DB62D58D-C037-45EE-B9CB-743985BD1164}"/>
+                <a16:creationId xmlns:a16="http://schemas.microsoft.com/office/drawing/2014/main" xmlns="" id="{67F5D0F3-00A9-4EE6-BC23-B483CF623CC8}"/>
               </a:ext>
             </a:extLst>
           </p:cNvPr>
@@ -6460,18 +6733,77 @@
             <a:spLocks noGrp="1"/>
           </p:cNvSpPr>
           <p:nvPr>
+            <p:ph type="title"/>
+          </p:nvPr>
+        </p:nvSpPr>
+        <p:spPr/>
+        <p:txBody>
+          <a:bodyPr/>
+          <a:lstStyle/>
+          <a:p>
+            <a:r>
+              <a:rPr lang="en-US" dirty="0" err="1" smtClean="0"/>
+              <a:t>SingleTon</a:t>
+            </a:r>
+            <a:r>
+              <a:rPr lang="en-US" dirty="0" smtClean="0"/>
+              <a:t> </a:t>
+            </a:r>
+            <a:r>
+              <a:rPr lang="en-US" dirty="0" err="1" smtClean="0"/>
+              <a:t>PromotionRepository</a:t>
+            </a:r>
+            <a:r>
+              <a:rPr lang="en-US" dirty="0" smtClean="0"/>
+              <a:t> diagram</a:t>
+            </a:r>
+            <a:r>
+              <a:rPr lang="en-US" dirty="0"/>
+              <a:t/>
+            </a:r>
+            <a:br>
+              <a:rPr lang="en-US" dirty="0"/>
+            </a:br>
+            <a:r>
+              <a:rPr lang="en-US" dirty="0" smtClean="0"/>
+              <a:t>(Singleton pattern</a:t>
+            </a:r>
+            <a:r>
+              <a:rPr lang="en-US" dirty="0"/>
+              <a:t>)</a:t>
+            </a:r>
+          </a:p>
+        </p:txBody>
+      </p:sp>
+      <p:pic>
+        <p:nvPicPr>
+          <p:cNvPr id="4" name="Content Placeholder 3"/>
+          <p:cNvPicPr>
+            <a:picLocks noGrp="1" noChangeAspect="1"/>
+          </p:cNvPicPr>
+          <p:nvPr>
             <p:ph sz="quarter" idx="13"/>
           </p:nvPr>
-        </p:nvSpPr>
-        <p:spPr/>
-        <p:txBody>
-          <a:bodyPr/>
-          <a:lstStyle/>
-          <a:p>
-            <a:endParaRPr lang="en-US"/>
-          </a:p>
-        </p:txBody>
-      </p:sp>
+        </p:nvPicPr>
+        <p:blipFill>
+          <a:blip r:embed="rId2">
+            <a:extLst>
+              <a:ext uri="{28A0092B-C50C-407E-A947-70E740481C1C}">
+                <a14:useLocalDpi xmlns:a14="http://schemas.microsoft.com/office/drawing/2010/main" val="0"/>
+              </a:ext>
+            </a:extLst>
+          </a:blip>
+          <a:stretch>
+            <a:fillRect/>
+          </a:stretch>
+        </p:blipFill>
+        <p:spPr>
+          <a:xfrm>
+            <a:off x="3524250" y="2561431"/>
+            <a:ext cx="5143500" cy="3035300"/>
+          </a:xfrm>
+        </p:spPr>
+      </p:pic>
     </p:spTree>
     <p:extLst>
       <p:ext uri="{BB962C8B-B14F-4D97-AF65-F5344CB8AC3E}">
@@ -6485,7 +6817,7 @@
 </p:sld>
 </file>
 
-<file path=ppt/slides/slide13.xml><?xml version="1.0" encoding="utf-8"?>
+<file path=ppt/slides/slide16.xml><?xml version="1.0" encoding="utf-8"?>
 <p:sld xmlns:a="http://schemas.openxmlformats.org/drawingml/2006/main" xmlns:r="http://schemas.openxmlformats.org/officeDocument/2006/relationships" xmlns:p="http://schemas.openxmlformats.org/presentationml/2006/main">
   <p:cSld>
     <p:bg>
@@ -6529,10 +6861,10 @@
           <p:cNvPr id="17" name="Picture 2">
             <a:extLst>
               <a:ext uri="{FF2B5EF4-FFF2-40B4-BE49-F238E27FC236}">
-                <a16:creationId xmlns:a16="http://schemas.microsoft.com/office/drawing/2014/main" id="{25496B42-CC46-4183-B481-887CD3E8C725}"/>
+                <a16:creationId xmlns:a16="http://schemas.microsoft.com/office/drawing/2014/main" xmlns="" id="{25496B42-CC46-4183-B481-887CD3E8C725}"/>
               </a:ext>
               <a:ext uri="{C183D7F6-B498-43B3-948B-1728B52AA6E4}">
-                <adec:decorative xmlns:adec="http://schemas.microsoft.com/office/drawing/2017/decorative" val="1"/>
+                <adec:decorative xmlns:adec="http://schemas.microsoft.com/office/drawing/2017/decorative" xmlns="" val="1"/>
               </a:ext>
             </a:extLst>
           </p:cNvPr>
@@ -6586,10 +6918,10 @@
           <p:cNvPr id="12" name="Picture 11">
             <a:extLst>
               <a:ext uri="{FF2B5EF4-FFF2-40B4-BE49-F238E27FC236}">
-                <a16:creationId xmlns:a16="http://schemas.microsoft.com/office/drawing/2014/main" id="{E2758CE0-F916-4DCE-88D1-71430BE441B2}"/>
+                <a16:creationId xmlns:a16="http://schemas.microsoft.com/office/drawing/2014/main" xmlns="" id="{E2758CE0-F916-4DCE-88D1-71430BE441B2}"/>
               </a:ext>
               <a:ext uri="{C183D7F6-B498-43B3-948B-1728B52AA6E4}">
-                <adec:decorative xmlns:adec="http://schemas.microsoft.com/office/drawing/2017/decorative" val="1"/>
+                <adec:decorative xmlns:adec="http://schemas.microsoft.com/office/drawing/2017/decorative" xmlns="" val="1"/>
               </a:ext>
             </a:extLst>
           </p:cNvPr>
@@ -6631,10 +6963,10 @@
           <p:cNvPr id="14" name="Rectangle 13">
             <a:extLst>
               <a:ext uri="{FF2B5EF4-FFF2-40B4-BE49-F238E27FC236}">
-                <a16:creationId xmlns:a16="http://schemas.microsoft.com/office/drawing/2014/main" id="{7E2BA2D5-46A3-46C0-98C9-A072D543B3AB}"/>
+                <a16:creationId xmlns:a16="http://schemas.microsoft.com/office/drawing/2014/main" xmlns="" id="{7E2BA2D5-46A3-46C0-98C9-A072D543B3AB}"/>
               </a:ext>
               <a:ext uri="{C183D7F6-B498-43B3-948B-1728B52AA6E4}">
-                <adec:decorative xmlns:adec="http://schemas.microsoft.com/office/drawing/2017/decorative" val="1"/>
+                <adec:decorative xmlns:adec="http://schemas.microsoft.com/office/drawing/2017/decorative" xmlns="" val="1"/>
               </a:ext>
             </a:extLst>
           </p:cNvPr>
@@ -6691,7 +7023,7 @@
           <p:cNvPr id="18" name="Content Placeholder 4">
             <a:extLst>
               <a:ext uri="{FF2B5EF4-FFF2-40B4-BE49-F238E27FC236}">
-                <a16:creationId xmlns:a16="http://schemas.microsoft.com/office/drawing/2014/main" id="{1BF1BFBC-8298-475D-B7CF-42E480585CF7}"/>
+                <a16:creationId xmlns:a16="http://schemas.microsoft.com/office/drawing/2014/main" xmlns="" id="{1BF1BFBC-8298-475D-B7CF-42E480585CF7}"/>
               </a:ext>
             </a:extLst>
           </p:cNvPr>
@@ -6744,10 +7076,10 @@
           <p:cNvPr id="16" name="Picture 15">
             <a:extLst>
               <a:ext uri="{FF2B5EF4-FFF2-40B4-BE49-F238E27FC236}">
-                <a16:creationId xmlns:a16="http://schemas.microsoft.com/office/drawing/2014/main" id="{3573895B-DA42-4260-AE1E-182BA4123286}"/>
+                <a16:creationId xmlns:a16="http://schemas.microsoft.com/office/drawing/2014/main" xmlns="" id="{3573895B-DA42-4260-AE1E-182BA4123286}"/>
               </a:ext>
               <a:ext uri="{C183D7F6-B498-43B3-948B-1728B52AA6E4}">
-                <adec:decorative xmlns:adec="http://schemas.microsoft.com/office/drawing/2017/decorative" val="1"/>
+                <adec:decorative xmlns:adec="http://schemas.microsoft.com/office/drawing/2017/decorative" xmlns="" val="1"/>
               </a:ext>
             </a:extLst>
           </p:cNvPr>
@@ -6789,7 +7121,7 @@
           <p:cNvPr id="2" name="Title 1">
             <a:extLst>
               <a:ext uri="{FF2B5EF4-FFF2-40B4-BE49-F238E27FC236}">
-                <a16:creationId xmlns:a16="http://schemas.microsoft.com/office/drawing/2014/main" id="{30D7EEC2-32B7-4760-9A2F-F93C19884366}"/>
+                <a16:creationId xmlns:a16="http://schemas.microsoft.com/office/drawing/2014/main" xmlns="" id="{30D7EEC2-32B7-4760-9A2F-F93C19884366}"/>
               </a:ext>
             </a:extLst>
           </p:cNvPr>
@@ -6839,7 +7171,7 @@
 </p:sld>
 </file>
 
-<file path=ppt/slides/slide14.xml><?xml version="1.0" encoding="utf-8"?>
+<file path=ppt/slides/slide17.xml><?xml version="1.0" encoding="utf-8"?>
 <p:sld xmlns:a="http://schemas.openxmlformats.org/drawingml/2006/main" xmlns:r="http://schemas.openxmlformats.org/officeDocument/2006/relationships" xmlns:p="http://schemas.openxmlformats.org/presentationml/2006/main">
   <p:cSld>
     <p:bg>
@@ -6883,10 +7215,10 @@
           <p:cNvPr id="22" name="Picture 2">
             <a:extLst>
               <a:ext uri="{FF2B5EF4-FFF2-40B4-BE49-F238E27FC236}">
-                <a16:creationId xmlns:a16="http://schemas.microsoft.com/office/drawing/2014/main" id="{25496B42-CC46-4183-B481-887CD3E8C725}"/>
+                <a16:creationId xmlns:a16="http://schemas.microsoft.com/office/drawing/2014/main" xmlns="" id="{25496B42-CC46-4183-B481-887CD3E8C725}"/>
               </a:ext>
               <a:ext uri="{C183D7F6-B498-43B3-948B-1728B52AA6E4}">
-                <adec:decorative xmlns:adec="http://schemas.microsoft.com/office/drawing/2017/decorative" val="1"/>
+                <adec:decorative xmlns:adec="http://schemas.microsoft.com/office/drawing/2017/decorative" xmlns="" val="1"/>
               </a:ext>
             </a:extLst>
           </p:cNvPr>
@@ -6940,10 +7272,10 @@
           <p:cNvPr id="24" name="Picture 23">
             <a:extLst>
               <a:ext uri="{FF2B5EF4-FFF2-40B4-BE49-F238E27FC236}">
-                <a16:creationId xmlns:a16="http://schemas.microsoft.com/office/drawing/2014/main" id="{E2758CE0-F916-4DCE-88D1-71430BE441B2}"/>
+                <a16:creationId xmlns:a16="http://schemas.microsoft.com/office/drawing/2014/main" xmlns="" id="{E2758CE0-F916-4DCE-88D1-71430BE441B2}"/>
               </a:ext>
               <a:ext uri="{C183D7F6-B498-43B3-948B-1728B52AA6E4}">
-                <adec:decorative xmlns:adec="http://schemas.microsoft.com/office/drawing/2017/decorative" val="1"/>
+                <adec:decorative xmlns:adec="http://schemas.microsoft.com/office/drawing/2017/decorative" xmlns="" val="1"/>
               </a:ext>
             </a:extLst>
           </p:cNvPr>
@@ -6985,10 +7317,10 @@
           <p:cNvPr id="26" name="Rectangle 25">
             <a:extLst>
               <a:ext uri="{FF2B5EF4-FFF2-40B4-BE49-F238E27FC236}">
-                <a16:creationId xmlns:a16="http://schemas.microsoft.com/office/drawing/2014/main" id="{7E2BA2D5-46A3-46C0-98C9-A072D543B3AB}"/>
+                <a16:creationId xmlns:a16="http://schemas.microsoft.com/office/drawing/2014/main" xmlns="" id="{7E2BA2D5-46A3-46C0-98C9-A072D543B3AB}"/>
               </a:ext>
               <a:ext uri="{C183D7F6-B498-43B3-948B-1728B52AA6E4}">
-                <adec:decorative xmlns:adec="http://schemas.microsoft.com/office/drawing/2017/decorative" val="1"/>
+                <adec:decorative xmlns:adec="http://schemas.microsoft.com/office/drawing/2017/decorative" xmlns="" val="1"/>
               </a:ext>
             </a:extLst>
           </p:cNvPr>
@@ -7045,7 +7377,7 @@
           <p:cNvPr id="6" name="Content Placeholder 5" descr="A close up of a map&#10;&#10;Description generated with high confidence">
             <a:extLst>
               <a:ext uri="{FF2B5EF4-FFF2-40B4-BE49-F238E27FC236}">
-                <a16:creationId xmlns:a16="http://schemas.microsoft.com/office/drawing/2014/main" id="{EF641963-4B59-49F1-BC36-190072A6C5BE}"/>
+                <a16:creationId xmlns:a16="http://schemas.microsoft.com/office/drawing/2014/main" xmlns="" id="{EF641963-4B59-49F1-BC36-190072A6C5BE}"/>
               </a:ext>
             </a:extLst>
           </p:cNvPr>
@@ -7098,10 +7430,10 @@
           <p:cNvPr id="28" name="Picture 27">
             <a:extLst>
               <a:ext uri="{FF2B5EF4-FFF2-40B4-BE49-F238E27FC236}">
-                <a16:creationId xmlns:a16="http://schemas.microsoft.com/office/drawing/2014/main" id="{3573895B-DA42-4260-AE1E-182BA4123286}"/>
+                <a16:creationId xmlns:a16="http://schemas.microsoft.com/office/drawing/2014/main" xmlns="" id="{3573895B-DA42-4260-AE1E-182BA4123286}"/>
               </a:ext>
               <a:ext uri="{C183D7F6-B498-43B3-948B-1728B52AA6E4}">
-                <adec:decorative xmlns:adec="http://schemas.microsoft.com/office/drawing/2017/decorative" val="1"/>
+                <adec:decorative xmlns:adec="http://schemas.microsoft.com/office/drawing/2017/decorative" xmlns="" val="1"/>
               </a:ext>
             </a:extLst>
           </p:cNvPr>
@@ -7143,7 +7475,7 @@
           <p:cNvPr id="2" name="Title 1">
             <a:extLst>
               <a:ext uri="{FF2B5EF4-FFF2-40B4-BE49-F238E27FC236}">
-                <a16:creationId xmlns:a16="http://schemas.microsoft.com/office/drawing/2014/main" id="{30D7EEC2-32B7-4760-9A2F-F93C19884366}"/>
+                <a16:creationId xmlns:a16="http://schemas.microsoft.com/office/drawing/2014/main" xmlns="" id="{30D7EEC2-32B7-4760-9A2F-F93C19884366}"/>
               </a:ext>
             </a:extLst>
           </p:cNvPr>
@@ -7193,7 +7525,7 @@
 </p:sld>
 </file>
 
-<file path=ppt/slides/slide15.xml><?xml version="1.0" encoding="utf-8"?>
+<file path=ppt/slides/slide18.xml><?xml version="1.0" encoding="utf-8"?>
 <p:sld xmlns:a="http://schemas.openxmlformats.org/drawingml/2006/main" xmlns:r="http://schemas.openxmlformats.org/officeDocument/2006/relationships" xmlns:p="http://schemas.openxmlformats.org/presentationml/2006/main">
   <p:cSld>
     <p:bg>
@@ -7237,10 +7569,10 @@
           <p:cNvPr id="33" name="Picture 2">
             <a:extLst>
               <a:ext uri="{FF2B5EF4-FFF2-40B4-BE49-F238E27FC236}">
-                <a16:creationId xmlns:a16="http://schemas.microsoft.com/office/drawing/2014/main" id="{25496B42-CC46-4183-B481-887CD3E8C725}"/>
+                <a16:creationId xmlns:a16="http://schemas.microsoft.com/office/drawing/2014/main" xmlns="" id="{25496B42-CC46-4183-B481-887CD3E8C725}"/>
               </a:ext>
               <a:ext uri="{C183D7F6-B498-43B3-948B-1728B52AA6E4}">
-                <adec:decorative xmlns:adec="http://schemas.microsoft.com/office/drawing/2017/decorative" val="1"/>
+                <adec:decorative xmlns:adec="http://schemas.microsoft.com/office/drawing/2017/decorative" xmlns="" val="1"/>
               </a:ext>
             </a:extLst>
           </p:cNvPr>
@@ -7294,10 +7626,10 @@
           <p:cNvPr id="35" name="Picture 34">
             <a:extLst>
               <a:ext uri="{FF2B5EF4-FFF2-40B4-BE49-F238E27FC236}">
-                <a16:creationId xmlns:a16="http://schemas.microsoft.com/office/drawing/2014/main" id="{E2758CE0-F916-4DCE-88D1-71430BE441B2}"/>
+                <a16:creationId xmlns:a16="http://schemas.microsoft.com/office/drawing/2014/main" xmlns="" id="{E2758CE0-F916-4DCE-88D1-71430BE441B2}"/>
               </a:ext>
               <a:ext uri="{C183D7F6-B498-43B3-948B-1728B52AA6E4}">
-                <adec:decorative xmlns:adec="http://schemas.microsoft.com/office/drawing/2017/decorative" val="1"/>
+                <adec:decorative xmlns:adec="http://schemas.microsoft.com/office/drawing/2017/decorative" xmlns="" val="1"/>
               </a:ext>
             </a:extLst>
           </p:cNvPr>
@@ -7339,10 +7671,10 @@
           <p:cNvPr id="37" name="Rectangle 36">
             <a:extLst>
               <a:ext uri="{FF2B5EF4-FFF2-40B4-BE49-F238E27FC236}">
-                <a16:creationId xmlns:a16="http://schemas.microsoft.com/office/drawing/2014/main" id="{7E2BA2D5-46A3-46C0-98C9-A072D543B3AB}"/>
+                <a16:creationId xmlns:a16="http://schemas.microsoft.com/office/drawing/2014/main" xmlns="" id="{7E2BA2D5-46A3-46C0-98C9-A072D543B3AB}"/>
               </a:ext>
               <a:ext uri="{C183D7F6-B498-43B3-948B-1728B52AA6E4}">
-                <adec:decorative xmlns:adec="http://schemas.microsoft.com/office/drawing/2017/decorative" val="1"/>
+                <adec:decorative xmlns:adec="http://schemas.microsoft.com/office/drawing/2017/decorative" xmlns="" val="1"/>
               </a:ext>
             </a:extLst>
           </p:cNvPr>
@@ -7399,7 +7731,7 @@
           <p:cNvPr id="7" name="Content Placeholder 6" descr="A screenshot of a cell phone&#10;&#10;Description generated with high confidence">
             <a:extLst>
               <a:ext uri="{FF2B5EF4-FFF2-40B4-BE49-F238E27FC236}">
-                <a16:creationId xmlns:a16="http://schemas.microsoft.com/office/drawing/2014/main" id="{AAA10C7F-D4BB-47C1-BBDD-42465ED992AE}"/>
+                <a16:creationId xmlns:a16="http://schemas.microsoft.com/office/drawing/2014/main" xmlns="" id="{AAA10C7F-D4BB-47C1-BBDD-42465ED992AE}"/>
               </a:ext>
             </a:extLst>
           </p:cNvPr>
@@ -7452,10 +7784,10 @@
           <p:cNvPr id="39" name="Picture 38">
             <a:extLst>
               <a:ext uri="{FF2B5EF4-FFF2-40B4-BE49-F238E27FC236}">
-                <a16:creationId xmlns:a16="http://schemas.microsoft.com/office/drawing/2014/main" id="{3573895B-DA42-4260-AE1E-182BA4123286}"/>
+                <a16:creationId xmlns:a16="http://schemas.microsoft.com/office/drawing/2014/main" xmlns="" id="{3573895B-DA42-4260-AE1E-182BA4123286}"/>
               </a:ext>
               <a:ext uri="{C183D7F6-B498-43B3-948B-1728B52AA6E4}">
-                <adec:decorative xmlns:adec="http://schemas.microsoft.com/office/drawing/2017/decorative" val="1"/>
+                <adec:decorative xmlns:adec="http://schemas.microsoft.com/office/drawing/2017/decorative" xmlns="" val="1"/>
               </a:ext>
             </a:extLst>
           </p:cNvPr>
@@ -7497,7 +7829,7 @@
           <p:cNvPr id="2" name="Title 1">
             <a:extLst>
               <a:ext uri="{FF2B5EF4-FFF2-40B4-BE49-F238E27FC236}">
-                <a16:creationId xmlns:a16="http://schemas.microsoft.com/office/drawing/2014/main" id="{30D7EEC2-32B7-4760-9A2F-F93C19884366}"/>
+                <a16:creationId xmlns:a16="http://schemas.microsoft.com/office/drawing/2014/main" xmlns="" id="{30D7EEC2-32B7-4760-9A2F-F93C19884366}"/>
               </a:ext>
             </a:extLst>
           </p:cNvPr>
@@ -7547,7 +7879,7 @@
 </p:sld>
 </file>
 
-<file path=ppt/slides/slide16.xml><?xml version="1.0" encoding="utf-8"?>
+<file path=ppt/slides/slide19.xml><?xml version="1.0" encoding="utf-8"?>
 <p:sld xmlns:a="http://schemas.openxmlformats.org/drawingml/2006/main" xmlns:r="http://schemas.openxmlformats.org/officeDocument/2006/relationships" xmlns:p="http://schemas.openxmlformats.org/presentationml/2006/main">
   <p:cSld>
     <p:spTree>
@@ -7569,7 +7901,7 @@
           <p:cNvPr id="2" name="Title 1">
             <a:extLst>
               <a:ext uri="{FF2B5EF4-FFF2-40B4-BE49-F238E27FC236}">
-                <a16:creationId xmlns:a16="http://schemas.microsoft.com/office/drawing/2014/main" id="{E59FD2A8-FB42-4CBA-A14D-BF8E9DEE218E}"/>
+                <a16:creationId xmlns:a16="http://schemas.microsoft.com/office/drawing/2014/main" xmlns="" id="{E59FD2A8-FB42-4CBA-A14D-BF8E9DEE218E}"/>
               </a:ext>
             </a:extLst>
           </p:cNvPr>
@@ -7597,7 +7929,7 @@
           <p:cNvPr id="3" name="Content Placeholder 2">
             <a:extLst>
               <a:ext uri="{FF2B5EF4-FFF2-40B4-BE49-F238E27FC236}">
-                <a16:creationId xmlns:a16="http://schemas.microsoft.com/office/drawing/2014/main" id="{1D764E88-BF68-4AAF-BF0C-9A4DF864C73A}"/>
+                <a16:creationId xmlns:a16="http://schemas.microsoft.com/office/drawing/2014/main" xmlns="" id="{1D764E88-BF68-4AAF-BF0C-9A4DF864C73A}"/>
               </a:ext>
             </a:extLst>
           </p:cNvPr>
@@ -7690,7 +8022,7 @@
           <p:cNvPr id="2" name="Title 1">
             <a:extLst>
               <a:ext uri="{FF2B5EF4-FFF2-40B4-BE49-F238E27FC236}">
-                <a16:creationId xmlns:a16="http://schemas.microsoft.com/office/drawing/2014/main" id="{AF422EDD-389C-49BE-ACDD-AE247AD159A0}"/>
+                <a16:creationId xmlns:a16="http://schemas.microsoft.com/office/drawing/2014/main" xmlns="" id="{AF422EDD-389C-49BE-ACDD-AE247AD159A0}"/>
               </a:ext>
             </a:extLst>
           </p:cNvPr>
@@ -7718,7 +8050,7 @@
           <p:cNvPr id="3" name="Content Placeholder 2">
             <a:extLst>
               <a:ext uri="{FF2B5EF4-FFF2-40B4-BE49-F238E27FC236}">
-                <a16:creationId xmlns:a16="http://schemas.microsoft.com/office/drawing/2014/main" id="{6BF2084C-67D9-43E3-AE6B-7BD1BC0CE26C}"/>
+                <a16:creationId xmlns:a16="http://schemas.microsoft.com/office/drawing/2014/main" xmlns="" id="{6BF2084C-67D9-43E3-AE6B-7BD1BC0CE26C}"/>
               </a:ext>
             </a:extLst>
           </p:cNvPr>
@@ -7935,7 +8267,17 @@
                   </a:schemeClr>
                 </a:solidFill>
               </a:rPr>
-              <a:t>Tuan Sang Tran</a:t>
+              <a:t>Tuan Sang </a:t>
+            </a:r>
+            <a:r>
+              <a:rPr lang="en-US" i="1" cap="none" dirty="0" smtClean="0">
+                <a:solidFill>
+                  <a:schemeClr val="bg1">
+                    <a:lumMod val="50000"/>
+                  </a:schemeClr>
+                </a:solidFill>
+              </a:rPr>
+              <a:t>Tran</a:t>
             </a:r>
             <a:endParaRPr lang="en-US" cap="none" dirty="0">
               <a:solidFill>
@@ -8035,7 +8377,7 @@
           <p:cNvPr id="2" name="Title 1">
             <a:extLst>
               <a:ext uri="{FF2B5EF4-FFF2-40B4-BE49-F238E27FC236}">
-                <a16:creationId xmlns:a16="http://schemas.microsoft.com/office/drawing/2014/main" id="{091B43AF-E94B-4B0A-BCD2-AD74812908EB}"/>
+                <a16:creationId xmlns:a16="http://schemas.microsoft.com/office/drawing/2014/main" xmlns="" id="{091B43AF-E94B-4B0A-BCD2-AD74812908EB}"/>
               </a:ext>
             </a:extLst>
           </p:cNvPr>
@@ -8063,7 +8405,7 @@
           <p:cNvPr id="3" name="Content Placeholder 2">
             <a:extLst>
               <a:ext uri="{FF2B5EF4-FFF2-40B4-BE49-F238E27FC236}">
-                <a16:creationId xmlns:a16="http://schemas.microsoft.com/office/drawing/2014/main" id="{3DD47F5E-D3F9-4C69-8D3B-211CBE215836}"/>
+                <a16:creationId xmlns:a16="http://schemas.microsoft.com/office/drawing/2014/main" xmlns="" id="{3DD47F5E-D3F9-4C69-8D3B-211CBE215836}"/>
               </a:ext>
             </a:extLst>
           </p:cNvPr>
@@ -8149,10 +8491,10 @@
           <p:cNvPr id="28" name="Picture 2">
             <a:extLst>
               <a:ext uri="{FF2B5EF4-FFF2-40B4-BE49-F238E27FC236}">
-                <a16:creationId xmlns:a16="http://schemas.microsoft.com/office/drawing/2014/main" id="{25496B42-CC46-4183-B481-887CD3E8C725}"/>
+                <a16:creationId xmlns:a16="http://schemas.microsoft.com/office/drawing/2014/main" xmlns="" id="{25496B42-CC46-4183-B481-887CD3E8C725}"/>
               </a:ext>
               <a:ext uri="{C183D7F6-B498-43B3-948B-1728B52AA6E4}">
-                <adec:decorative xmlns:adec="http://schemas.microsoft.com/office/drawing/2017/decorative" val="1"/>
+                <adec:decorative xmlns:adec="http://schemas.microsoft.com/office/drawing/2017/decorative" xmlns="" val="1"/>
               </a:ext>
             </a:extLst>
           </p:cNvPr>
@@ -8206,10 +8548,10 @@
           <p:cNvPr id="30" name="Picture 29">
             <a:extLst>
               <a:ext uri="{FF2B5EF4-FFF2-40B4-BE49-F238E27FC236}">
-                <a16:creationId xmlns:a16="http://schemas.microsoft.com/office/drawing/2014/main" id="{E2758CE0-F916-4DCE-88D1-71430BE441B2}"/>
+                <a16:creationId xmlns:a16="http://schemas.microsoft.com/office/drawing/2014/main" xmlns="" id="{E2758CE0-F916-4DCE-88D1-71430BE441B2}"/>
               </a:ext>
               <a:ext uri="{C183D7F6-B498-43B3-948B-1728B52AA6E4}">
-                <adec:decorative xmlns:adec="http://schemas.microsoft.com/office/drawing/2017/decorative" val="1"/>
+                <adec:decorative xmlns:adec="http://schemas.microsoft.com/office/drawing/2017/decorative" xmlns="" val="1"/>
               </a:ext>
             </a:extLst>
           </p:cNvPr>
@@ -8251,10 +8593,10 @@
           <p:cNvPr id="32" name="Rectangle 31">
             <a:extLst>
               <a:ext uri="{FF2B5EF4-FFF2-40B4-BE49-F238E27FC236}">
-                <a16:creationId xmlns:a16="http://schemas.microsoft.com/office/drawing/2014/main" id="{7E2BA2D5-46A3-46C0-98C9-A072D543B3AB}"/>
+                <a16:creationId xmlns:a16="http://schemas.microsoft.com/office/drawing/2014/main" xmlns="" id="{7E2BA2D5-46A3-46C0-98C9-A072D543B3AB}"/>
               </a:ext>
               <a:ext uri="{C183D7F6-B498-43B3-948B-1728B52AA6E4}">
-                <adec:decorative xmlns:adec="http://schemas.microsoft.com/office/drawing/2017/decorative" val="1"/>
+                <adec:decorative xmlns:adec="http://schemas.microsoft.com/office/drawing/2017/decorative" xmlns="" val="1"/>
               </a:ext>
             </a:extLst>
           </p:cNvPr>
@@ -8311,7 +8653,7 @@
           <p:cNvPr id="23" name="Content Placeholder 22">
             <a:extLst>
               <a:ext uri="{FF2B5EF4-FFF2-40B4-BE49-F238E27FC236}">
-                <a16:creationId xmlns:a16="http://schemas.microsoft.com/office/drawing/2014/main" id="{A475A5FB-CB7E-4CD3-8E36-EBD3DDEC8BE5}"/>
+                <a16:creationId xmlns:a16="http://schemas.microsoft.com/office/drawing/2014/main" xmlns="" id="{A475A5FB-CB7E-4CD3-8E36-EBD3DDEC8BE5}"/>
               </a:ext>
             </a:extLst>
           </p:cNvPr>
@@ -8364,10 +8706,10 @@
           <p:cNvPr id="34" name="Picture 33">
             <a:extLst>
               <a:ext uri="{FF2B5EF4-FFF2-40B4-BE49-F238E27FC236}">
-                <a16:creationId xmlns:a16="http://schemas.microsoft.com/office/drawing/2014/main" id="{3573895B-DA42-4260-AE1E-182BA4123286}"/>
+                <a16:creationId xmlns:a16="http://schemas.microsoft.com/office/drawing/2014/main" xmlns="" id="{3573895B-DA42-4260-AE1E-182BA4123286}"/>
               </a:ext>
               <a:ext uri="{C183D7F6-B498-43B3-948B-1728B52AA6E4}">
-                <adec:decorative xmlns:adec="http://schemas.microsoft.com/office/drawing/2017/decorative" val="1"/>
+                <adec:decorative xmlns:adec="http://schemas.microsoft.com/office/drawing/2017/decorative" xmlns="" val="1"/>
               </a:ext>
             </a:extLst>
           </p:cNvPr>
@@ -8409,7 +8751,7 @@
           <p:cNvPr id="2" name="Title 1">
             <a:extLst>
               <a:ext uri="{FF2B5EF4-FFF2-40B4-BE49-F238E27FC236}">
-                <a16:creationId xmlns:a16="http://schemas.microsoft.com/office/drawing/2014/main" id="{88BD7413-7A07-45C2-BB64-5DE637556B0E}"/>
+                <a16:creationId xmlns:a16="http://schemas.microsoft.com/office/drawing/2014/main" xmlns="" id="{88BD7413-7A07-45C2-BB64-5DE637556B0E}"/>
               </a:ext>
             </a:extLst>
           </p:cNvPr>
@@ -8496,10 +8838,10 @@
           <p:cNvPr id="10" name="Picture 2">
             <a:extLst>
               <a:ext uri="{FF2B5EF4-FFF2-40B4-BE49-F238E27FC236}">
-                <a16:creationId xmlns:a16="http://schemas.microsoft.com/office/drawing/2014/main" id="{25496B42-CC46-4183-B481-887CD3E8C725}"/>
+                <a16:creationId xmlns:a16="http://schemas.microsoft.com/office/drawing/2014/main" xmlns="" id="{25496B42-CC46-4183-B481-887CD3E8C725}"/>
               </a:ext>
               <a:ext uri="{C183D7F6-B498-43B3-948B-1728B52AA6E4}">
-                <adec:decorative xmlns:adec="http://schemas.microsoft.com/office/drawing/2017/decorative" val="1"/>
+                <adec:decorative xmlns:adec="http://schemas.microsoft.com/office/drawing/2017/decorative" xmlns="" val="1"/>
               </a:ext>
             </a:extLst>
           </p:cNvPr>
@@ -8553,10 +8895,10 @@
           <p:cNvPr id="12" name="Picture 11">
             <a:extLst>
               <a:ext uri="{FF2B5EF4-FFF2-40B4-BE49-F238E27FC236}">
-                <a16:creationId xmlns:a16="http://schemas.microsoft.com/office/drawing/2014/main" id="{E2758CE0-F916-4DCE-88D1-71430BE441B2}"/>
+                <a16:creationId xmlns:a16="http://schemas.microsoft.com/office/drawing/2014/main" xmlns="" id="{E2758CE0-F916-4DCE-88D1-71430BE441B2}"/>
               </a:ext>
               <a:ext uri="{C183D7F6-B498-43B3-948B-1728B52AA6E4}">
-                <adec:decorative xmlns:adec="http://schemas.microsoft.com/office/drawing/2017/decorative" val="1"/>
+                <adec:decorative xmlns:adec="http://schemas.microsoft.com/office/drawing/2017/decorative" xmlns="" val="1"/>
               </a:ext>
             </a:extLst>
           </p:cNvPr>
@@ -8598,10 +8940,10 @@
           <p:cNvPr id="14" name="Rectangle 13">
             <a:extLst>
               <a:ext uri="{FF2B5EF4-FFF2-40B4-BE49-F238E27FC236}">
-                <a16:creationId xmlns:a16="http://schemas.microsoft.com/office/drawing/2014/main" id="{7E2BA2D5-46A3-46C0-98C9-A072D543B3AB}"/>
+                <a16:creationId xmlns:a16="http://schemas.microsoft.com/office/drawing/2014/main" xmlns="" id="{7E2BA2D5-46A3-46C0-98C9-A072D543B3AB}"/>
               </a:ext>
               <a:ext uri="{C183D7F6-B498-43B3-948B-1728B52AA6E4}">
-                <adec:decorative xmlns:adec="http://schemas.microsoft.com/office/drawing/2017/decorative" val="1"/>
+                <adec:decorative xmlns:adec="http://schemas.microsoft.com/office/drawing/2017/decorative" xmlns="" val="1"/>
               </a:ext>
             </a:extLst>
           </p:cNvPr>
@@ -8658,7 +9000,7 @@
           <p:cNvPr id="5" name="Content Placeholder 4" descr="A picture containing text, map&#10;&#10;Description generated with very high confidence">
             <a:extLst>
               <a:ext uri="{FF2B5EF4-FFF2-40B4-BE49-F238E27FC236}">
-                <a16:creationId xmlns:a16="http://schemas.microsoft.com/office/drawing/2014/main" id="{919BFE5E-83FC-447A-A55B-72346363D0A9}"/>
+                <a16:creationId xmlns:a16="http://schemas.microsoft.com/office/drawing/2014/main" xmlns="" id="{919BFE5E-83FC-447A-A55B-72346363D0A9}"/>
               </a:ext>
             </a:extLst>
           </p:cNvPr>
@@ -8711,10 +9053,10 @@
           <p:cNvPr id="16" name="Picture 15">
             <a:extLst>
               <a:ext uri="{FF2B5EF4-FFF2-40B4-BE49-F238E27FC236}">
-                <a16:creationId xmlns:a16="http://schemas.microsoft.com/office/drawing/2014/main" id="{3573895B-DA42-4260-AE1E-182BA4123286}"/>
+                <a16:creationId xmlns:a16="http://schemas.microsoft.com/office/drawing/2014/main" xmlns="" id="{3573895B-DA42-4260-AE1E-182BA4123286}"/>
               </a:ext>
               <a:ext uri="{C183D7F6-B498-43B3-948B-1728B52AA6E4}">
-                <adec:decorative xmlns:adec="http://schemas.microsoft.com/office/drawing/2017/decorative" val="1"/>
+                <adec:decorative xmlns:adec="http://schemas.microsoft.com/office/drawing/2017/decorative" xmlns="" val="1"/>
               </a:ext>
             </a:extLst>
           </p:cNvPr>
@@ -8756,7 +9098,7 @@
           <p:cNvPr id="2" name="Title 1">
             <a:extLst>
               <a:ext uri="{FF2B5EF4-FFF2-40B4-BE49-F238E27FC236}">
-                <a16:creationId xmlns:a16="http://schemas.microsoft.com/office/drawing/2014/main" id="{5D1A5B2B-A278-4F2C-914A-B8F7268D264C}"/>
+                <a16:creationId xmlns:a16="http://schemas.microsoft.com/office/drawing/2014/main" xmlns="" id="{5D1A5B2B-A278-4F2C-914A-B8F7268D264C}"/>
               </a:ext>
             </a:extLst>
           </p:cNvPr>
@@ -8821,7 +9163,7 @@
           <p:cNvPr id="2" name="Title 1">
             <a:extLst>
               <a:ext uri="{FF2B5EF4-FFF2-40B4-BE49-F238E27FC236}">
-                <a16:creationId xmlns:a16="http://schemas.microsoft.com/office/drawing/2014/main" id="{8B9D131A-285E-47B2-8A3D-AF9E06B2E8FD}"/>
+                <a16:creationId xmlns:a16="http://schemas.microsoft.com/office/drawing/2014/main" xmlns="" id="{8B9D131A-285E-47B2-8A3D-AF9E06B2E8FD}"/>
               </a:ext>
             </a:extLst>
           </p:cNvPr>
@@ -8849,7 +9191,7 @@
           <p:cNvPr id="3" name="Content Placeholder 2">
             <a:extLst>
               <a:ext uri="{FF2B5EF4-FFF2-40B4-BE49-F238E27FC236}">
-                <a16:creationId xmlns:a16="http://schemas.microsoft.com/office/drawing/2014/main" id="{EA0511AF-B220-4F38-BD2D-F62D975EE520}"/>
+                <a16:creationId xmlns:a16="http://schemas.microsoft.com/office/drawing/2014/main" xmlns="" id="{EA0511AF-B220-4F38-BD2D-F62D975EE520}"/>
               </a:ext>
             </a:extLst>
           </p:cNvPr>
@@ -8935,7 +9277,7 @@
           <p:cNvPr id="2" name="Title 1">
             <a:extLst>
               <a:ext uri="{FF2B5EF4-FFF2-40B4-BE49-F238E27FC236}">
-                <a16:creationId xmlns:a16="http://schemas.microsoft.com/office/drawing/2014/main" id="{DA2246C3-10C2-4623-AB3C-774ADBEE53B6}"/>
+                <a16:creationId xmlns:a16="http://schemas.microsoft.com/office/drawing/2014/main" xmlns="" id="{DA2246C3-10C2-4623-AB3C-774ADBEE53B6}"/>
               </a:ext>
             </a:extLst>
           </p:cNvPr>
@@ -8963,7 +9305,7 @@
           <p:cNvPr id="3" name="Content Placeholder 2">
             <a:extLst>
               <a:ext uri="{FF2B5EF4-FFF2-40B4-BE49-F238E27FC236}">
-                <a16:creationId xmlns:a16="http://schemas.microsoft.com/office/drawing/2014/main" id="{D943220A-A9F3-4AF8-B20E-73ACB33C0F8D}"/>
+                <a16:creationId xmlns:a16="http://schemas.microsoft.com/office/drawing/2014/main" xmlns="" id="{D943220A-A9F3-4AF8-B20E-73ACB33C0F8D}"/>
               </a:ext>
             </a:extLst>
           </p:cNvPr>
@@ -9022,9 +9364,10 @@
               <a:t>, </a:t>
             </a:r>
             <a:r>
-              <a:rPr lang="en-US" i="1" cap="none" dirty="0"/>
-              <a:t>prototype</a:t>
-            </a:r>
+              <a:rPr lang="en-US" i="1" cap="none" dirty="0" smtClean="0"/>
+              <a:t>prototype, mediator, factory method, singleton</a:t>
+            </a:r>
+            <a:endParaRPr lang="en-US" i="1" cap="none" dirty="0"/>
           </a:p>
           <a:p>
             <a:r>
@@ -9096,7 +9439,7 @@
           <p:cNvPr id="2" name="Title 1">
             <a:extLst>
               <a:ext uri="{FF2B5EF4-FFF2-40B4-BE49-F238E27FC236}">
-                <a16:creationId xmlns:a16="http://schemas.microsoft.com/office/drawing/2014/main" id="{0D7D4711-EF6A-4ADF-93F1-586460AB0708}"/>
+                <a16:creationId xmlns:a16="http://schemas.microsoft.com/office/drawing/2014/main" xmlns="" id="{0D7D4711-EF6A-4ADF-93F1-586460AB0708}"/>
               </a:ext>
             </a:extLst>
           </p:cNvPr>
@@ -9131,7 +9474,7 @@
           <p:cNvPr id="3" name="Content Placeholder 2">
             <a:extLst>
               <a:ext uri="{FF2B5EF4-FFF2-40B4-BE49-F238E27FC236}">
-                <a16:creationId xmlns:a16="http://schemas.microsoft.com/office/drawing/2014/main" id="{9E6AF24B-80CF-4678-AFB2-B0E09B362E4C}"/>
+                <a16:creationId xmlns:a16="http://schemas.microsoft.com/office/drawing/2014/main" xmlns="" id="{9E6AF24B-80CF-4678-AFB2-B0E09B362E4C}"/>
               </a:ext>
             </a:extLst>
           </p:cNvPr>
@@ -9186,7 +9529,7 @@
           <p:cNvPr id="2" name="Title 1">
             <a:extLst>
               <a:ext uri="{FF2B5EF4-FFF2-40B4-BE49-F238E27FC236}">
-                <a16:creationId xmlns:a16="http://schemas.microsoft.com/office/drawing/2014/main" id="{A2990ABB-ACF6-42C2-AE07-A572C9658CB7}"/>
+                <a16:creationId xmlns:a16="http://schemas.microsoft.com/office/drawing/2014/main" xmlns="" id="{A2990ABB-ACF6-42C2-AE07-A572C9658CB7}"/>
               </a:ext>
             </a:extLst>
           </p:cNvPr>
@@ -9221,7 +9564,7 @@
           <p:cNvPr id="3" name="Content Placeholder 2">
             <a:extLst>
               <a:ext uri="{FF2B5EF4-FFF2-40B4-BE49-F238E27FC236}">
-                <a16:creationId xmlns:a16="http://schemas.microsoft.com/office/drawing/2014/main" id="{ECB360A8-56F3-46C1-B4F3-780D47DDDE01}"/>
+                <a16:creationId xmlns:a16="http://schemas.microsoft.com/office/drawing/2014/main" xmlns="" id="{ECB360A8-56F3-46C1-B4F3-780D47DDDE01}"/>
               </a:ext>
             </a:extLst>
           </p:cNvPr>

</xml_diff>